<commit_message>
slides for rotation meeting 20211012
</commit_message>
<xml_diff>
--- a/Summary/20210111_demo_for_ccgb_rotation_update.pptx
+++ b/Summary/20210111_demo_for_ccgb_rotation_update.pptx
@@ -5,7 +5,7 @@
     <p:sldMasterId id="2147483648" r:id="rId1"/>
   </p:sldMasterIdLst>
   <p:notesMasterIdLst>
-    <p:notesMasterId r:id="rId9"/>
+    <p:notesMasterId r:id="rId13"/>
   </p:notesMasterIdLst>
   <p:sldIdLst>
     <p:sldId id="256" r:id="rId2"/>
@@ -13,8 +13,12 @@
     <p:sldId id="257" r:id="rId4"/>
     <p:sldId id="288" r:id="rId5"/>
     <p:sldId id="290" r:id="rId6"/>
-    <p:sldId id="278" r:id="rId7"/>
-    <p:sldId id="273" r:id="rId8"/>
+    <p:sldId id="291" r:id="rId7"/>
+    <p:sldId id="292" r:id="rId8"/>
+    <p:sldId id="293" r:id="rId9"/>
+    <p:sldId id="294" r:id="rId10"/>
+    <p:sldId id="278" r:id="rId11"/>
+    <p:sldId id="273" r:id="rId12"/>
   </p:sldIdLst>
   <p:sldSz cx="12192000" cy="6858000"/>
   <p:notesSz cx="6858000" cy="9144000"/>
@@ -123,6 +127,10 @@
             <p14:sldId id="257"/>
             <p14:sldId id="288"/>
             <p14:sldId id="290"/>
+            <p14:sldId id="291"/>
+            <p14:sldId id="292"/>
+            <p14:sldId id="293"/>
+            <p14:sldId id="294"/>
             <p14:sldId id="278"/>
             <p14:sldId id="273"/>
           </p14:sldIdLst>
@@ -218,7 +226,7 @@
           <a:p>
             <a:fld id="{2F446724-7A58-4020-9182-8374F0305DD3}" type="datetimeFigureOut">
               <a:rPr lang="en-US" smtClean="0"/>
-              <a:t>1/11/2021</a:t>
+              <a:t>1/12/2021</a:t>
             </a:fld>
             <a:endParaRPr lang="en-US"/>
           </a:p>
@@ -718,7 +726,7 @@
           <a:p>
             <a:fld id="{9D984E8B-8157-4976-ABDF-6DA2CAC3440F}" type="slidenum">
               <a:rPr lang="en-US" smtClean="0"/>
-              <a:t>6</a:t>
+              <a:t>10</a:t>
             </a:fld>
             <a:endParaRPr lang="en-US"/>
           </a:p>
@@ -884,7 +892,7 @@
           <a:p>
             <a:fld id="{6A6E4237-9E27-40CF-A4D8-1330F92F21DA}" type="datetimeFigureOut">
               <a:rPr lang="en-US" smtClean="0"/>
-              <a:t>1/11/2021</a:t>
+              <a:t>1/12/2021</a:t>
             </a:fld>
             <a:endParaRPr lang="en-US"/>
           </a:p>
@@ -1082,7 +1090,7 @@
           <a:p>
             <a:fld id="{6A6E4237-9E27-40CF-A4D8-1330F92F21DA}" type="datetimeFigureOut">
               <a:rPr lang="en-US" smtClean="0"/>
-              <a:t>1/11/2021</a:t>
+              <a:t>1/12/2021</a:t>
             </a:fld>
             <a:endParaRPr lang="en-US"/>
           </a:p>
@@ -1290,7 +1298,7 @@
           <a:p>
             <a:fld id="{6A6E4237-9E27-40CF-A4D8-1330F92F21DA}" type="datetimeFigureOut">
               <a:rPr lang="en-US" smtClean="0"/>
-              <a:t>1/11/2021</a:t>
+              <a:t>1/12/2021</a:t>
             </a:fld>
             <a:endParaRPr lang="en-US"/>
           </a:p>
@@ -1488,7 +1496,7 @@
           <a:p>
             <a:fld id="{6A6E4237-9E27-40CF-A4D8-1330F92F21DA}" type="datetimeFigureOut">
               <a:rPr lang="en-US" smtClean="0"/>
-              <a:t>1/11/2021</a:t>
+              <a:t>1/12/2021</a:t>
             </a:fld>
             <a:endParaRPr lang="en-US"/>
           </a:p>
@@ -1763,7 +1771,7 @@
           <a:p>
             <a:fld id="{6A6E4237-9E27-40CF-A4D8-1330F92F21DA}" type="datetimeFigureOut">
               <a:rPr lang="en-US" smtClean="0"/>
-              <a:t>1/11/2021</a:t>
+              <a:t>1/12/2021</a:t>
             </a:fld>
             <a:endParaRPr lang="en-US"/>
           </a:p>
@@ -2028,7 +2036,7 @@
           <a:p>
             <a:fld id="{6A6E4237-9E27-40CF-A4D8-1330F92F21DA}" type="datetimeFigureOut">
               <a:rPr lang="en-US" smtClean="0"/>
-              <a:t>1/11/2021</a:t>
+              <a:t>1/12/2021</a:t>
             </a:fld>
             <a:endParaRPr lang="en-US"/>
           </a:p>
@@ -2440,7 +2448,7 @@
           <a:p>
             <a:fld id="{6A6E4237-9E27-40CF-A4D8-1330F92F21DA}" type="datetimeFigureOut">
               <a:rPr lang="en-US" smtClean="0"/>
-              <a:t>1/11/2021</a:t>
+              <a:t>1/12/2021</a:t>
             </a:fld>
             <a:endParaRPr lang="en-US"/>
           </a:p>
@@ -2581,7 +2589,7 @@
           <a:p>
             <a:fld id="{6A6E4237-9E27-40CF-A4D8-1330F92F21DA}" type="datetimeFigureOut">
               <a:rPr lang="en-US" smtClean="0"/>
-              <a:t>1/11/2021</a:t>
+              <a:t>1/12/2021</a:t>
             </a:fld>
             <a:endParaRPr lang="en-US"/>
           </a:p>
@@ -2694,7 +2702,7 @@
           <a:p>
             <a:fld id="{6A6E4237-9E27-40CF-A4D8-1330F92F21DA}" type="datetimeFigureOut">
               <a:rPr lang="en-US" smtClean="0"/>
-              <a:t>1/11/2021</a:t>
+              <a:t>1/12/2021</a:t>
             </a:fld>
             <a:endParaRPr lang="en-US"/>
           </a:p>
@@ -3005,7 +3013,7 @@
           <a:p>
             <a:fld id="{6A6E4237-9E27-40CF-A4D8-1330F92F21DA}" type="datetimeFigureOut">
               <a:rPr lang="en-US" smtClean="0"/>
-              <a:t>1/11/2021</a:t>
+              <a:t>1/12/2021</a:t>
             </a:fld>
             <a:endParaRPr lang="en-US"/>
           </a:p>
@@ -3293,7 +3301,7 @@
           <a:p>
             <a:fld id="{6A6E4237-9E27-40CF-A4D8-1330F92F21DA}" type="datetimeFigureOut">
               <a:rPr lang="en-US" smtClean="0"/>
-              <a:t>1/11/2021</a:t>
+              <a:t>1/12/2021</a:t>
             </a:fld>
             <a:endParaRPr lang="en-US"/>
           </a:p>
@@ -3534,7 +3542,7 @@
           <a:p>
             <a:fld id="{6A6E4237-9E27-40CF-A4D8-1330F92F21DA}" type="datetimeFigureOut">
               <a:rPr lang="en-US" smtClean="0"/>
-              <a:t>1/11/2021</a:t>
+              <a:t>1/12/2021</a:t>
             </a:fld>
             <a:endParaRPr lang="en-US"/>
           </a:p>
@@ -4090,6 +4098,290 @@
 </p:sld>
 </file>
 
+<file path=ppt/slides/slide10.xml><?xml version="1.0" encoding="utf-8"?>
+<p:sld xmlns:a="http://schemas.openxmlformats.org/drawingml/2006/main" xmlns:r="http://schemas.openxmlformats.org/officeDocument/2006/relationships" xmlns:p="http://schemas.openxmlformats.org/presentationml/2006/main">
+  <p:cSld>
+    <p:spTree>
+      <p:nvGrpSpPr>
+        <p:cNvPr id="1" name=""/>
+        <p:cNvGrpSpPr/>
+        <p:nvPr/>
+      </p:nvGrpSpPr>
+      <p:grpSpPr>
+        <a:xfrm>
+          <a:off x="0" y="0"/>
+          <a:ext cx="0" cy="0"/>
+          <a:chOff x="0" y="0"/>
+          <a:chExt cx="0" cy="0"/>
+        </a:xfrm>
+      </p:grpSpPr>
+      <p:sp>
+        <p:nvSpPr>
+          <p:cNvPr id="2" name="Title 1">
+            <a:extLst>
+              <a:ext uri="{FF2B5EF4-FFF2-40B4-BE49-F238E27FC236}">
+                <a16:creationId xmlns:a16="http://schemas.microsoft.com/office/drawing/2014/main" id="{1DA4FD9C-0575-4672-BDCF-805449EFAC7C}"/>
+              </a:ext>
+            </a:extLst>
+          </p:cNvPr>
+          <p:cNvSpPr>
+            <a:spLocks noGrp="1"/>
+          </p:cNvSpPr>
+          <p:nvPr>
+            <p:ph type="title"/>
+          </p:nvPr>
+        </p:nvSpPr>
+        <p:spPr/>
+        <p:txBody>
+          <a:bodyPr/>
+          <a:lstStyle/>
+          <a:p>
+            <a:r>
+              <a:rPr lang="en-US" dirty="0"/>
+              <a:t>//TODO</a:t>
+            </a:r>
+          </a:p>
+        </p:txBody>
+      </p:sp>
+      <p:sp>
+        <p:nvSpPr>
+          <p:cNvPr id="3" name="Content Placeholder 2">
+            <a:extLst>
+              <a:ext uri="{FF2B5EF4-FFF2-40B4-BE49-F238E27FC236}">
+                <a16:creationId xmlns:a16="http://schemas.microsoft.com/office/drawing/2014/main" id="{B7017510-3A51-4778-BB7F-0F91AE0D6F96}"/>
+              </a:ext>
+            </a:extLst>
+          </p:cNvPr>
+          <p:cNvSpPr>
+            <a:spLocks noGrp="1"/>
+          </p:cNvSpPr>
+          <p:nvPr>
+            <p:ph idx="1"/>
+          </p:nvPr>
+        </p:nvSpPr>
+        <p:spPr/>
+        <p:txBody>
+          <a:bodyPr>
+            <a:normAutofit/>
+          </a:bodyPr>
+          <a:lstStyle/>
+          <a:p>
+            <a:r>
+              <a:rPr lang="en-US" dirty="0">
+                <a:sym typeface="Wingdings" panose="05000000000000000000" pitchFamily="2" charset="2"/>
+              </a:rPr>
+              <a:t>Convert output </a:t>
+            </a:r>
+            <a:r>
+              <a:rPr lang="en-US" dirty="0" err="1">
+                <a:sym typeface="Wingdings" panose="05000000000000000000" pitchFamily="2" charset="2"/>
+              </a:rPr>
+              <a:t>sfs</a:t>
+            </a:r>
+            <a:r>
+              <a:rPr lang="en-US" dirty="0">
+                <a:sym typeface="Wingdings" panose="05000000000000000000" pitchFamily="2" charset="2"/>
+              </a:rPr>
+              <a:t> formatting to </a:t>
+            </a:r>
+            <a:r>
+              <a:rPr lang="en-US" dirty="0" err="1">
+                <a:sym typeface="Wingdings" panose="05000000000000000000" pitchFamily="2" charset="2"/>
+              </a:rPr>
+              <a:t>Dadi</a:t>
+            </a:r>
+            <a:r>
+              <a:rPr lang="en-US" dirty="0">
+                <a:sym typeface="Wingdings" panose="05000000000000000000" pitchFamily="2" charset="2"/>
+              </a:rPr>
+              <a:t> format (or </a:t>
+            </a:r>
+            <a:r>
+              <a:rPr lang="en-US" dirty="0" err="1">
+                <a:sym typeface="Wingdings" panose="05000000000000000000" pitchFamily="2" charset="2"/>
+              </a:rPr>
+              <a:t>easySFS</a:t>
+            </a:r>
+            <a:r>
+              <a:rPr lang="en-US" dirty="0">
+                <a:sym typeface="Wingdings" panose="05000000000000000000" pitchFamily="2" charset="2"/>
+              </a:rPr>
+              <a:t>)</a:t>
+            </a:r>
+          </a:p>
+          <a:p>
+            <a:pPr lvl="1"/>
+            <a:r>
+              <a:rPr lang="en-US" dirty="0">
+                <a:sym typeface="Wingdings" panose="05000000000000000000" pitchFamily="2" charset="2"/>
+              </a:rPr>
+              <a:t>I will aim to have this by meeting tomorrow.</a:t>
+            </a:r>
+          </a:p>
+          <a:p>
+            <a:r>
+              <a:rPr lang="en-US" dirty="0">
+                <a:sym typeface="Wingdings" panose="05000000000000000000" pitchFamily="2" charset="2"/>
+              </a:rPr>
+              <a:t>Touch up plotting script</a:t>
+            </a:r>
+          </a:p>
+          <a:p>
+            <a:pPr lvl="1"/>
+            <a:r>
+              <a:rPr lang="en-US" dirty="0">
+                <a:sym typeface="Wingdings" panose="05000000000000000000" pitchFamily="2" charset="2"/>
+              </a:rPr>
+              <a:t>E.g., parse input and output so that it can quickly plot different a different species.</a:t>
+            </a:r>
+          </a:p>
+          <a:p>
+            <a:r>
+              <a:rPr lang="en-US" dirty="0">
+                <a:sym typeface="Wingdings" panose="05000000000000000000" pitchFamily="2" charset="2"/>
+              </a:rPr>
+              <a:t>Find reasonable initial guesses for demographic params</a:t>
+            </a:r>
+          </a:p>
+          <a:p>
+            <a:endParaRPr lang="en-US" dirty="0">
+              <a:sym typeface="Wingdings" panose="05000000000000000000" pitchFamily="2" charset="2"/>
+            </a:endParaRPr>
+          </a:p>
+          <a:p>
+            <a:endParaRPr lang="en-US" dirty="0">
+              <a:sym typeface="Wingdings" panose="05000000000000000000" pitchFamily="2" charset="2"/>
+            </a:endParaRPr>
+          </a:p>
+        </p:txBody>
+      </p:sp>
+    </p:spTree>
+    <p:extLst>
+      <p:ext uri="{BB962C8B-B14F-4D97-AF65-F5344CB8AC3E}">
+        <p14:creationId xmlns:p14="http://schemas.microsoft.com/office/powerpoint/2010/main" val="1230404432"/>
+      </p:ext>
+    </p:extLst>
+  </p:cSld>
+  <p:clrMapOvr>
+    <a:masterClrMapping/>
+  </p:clrMapOvr>
+</p:sld>
+</file>
+
+<file path=ppt/slides/slide11.xml><?xml version="1.0" encoding="utf-8"?>
+<p:sld xmlns:a="http://schemas.openxmlformats.org/drawingml/2006/main" xmlns:r="http://schemas.openxmlformats.org/officeDocument/2006/relationships" xmlns:p="http://schemas.openxmlformats.org/presentationml/2006/main">
+  <p:cSld>
+    <p:spTree>
+      <p:nvGrpSpPr>
+        <p:cNvPr id="1" name=""/>
+        <p:cNvGrpSpPr/>
+        <p:nvPr/>
+      </p:nvGrpSpPr>
+      <p:grpSpPr>
+        <a:xfrm>
+          <a:off x="0" y="0"/>
+          <a:ext cx="0" cy="0"/>
+          <a:chOff x="0" y="0"/>
+          <a:chExt cx="0" cy="0"/>
+        </a:xfrm>
+      </p:grpSpPr>
+      <p:sp>
+        <p:nvSpPr>
+          <p:cNvPr id="2" name="Title 1">
+            <a:extLst>
+              <a:ext uri="{FF2B5EF4-FFF2-40B4-BE49-F238E27FC236}">
+                <a16:creationId xmlns:a16="http://schemas.microsoft.com/office/drawing/2014/main" id="{1DA4FD9C-0575-4672-BDCF-805449EFAC7C}"/>
+              </a:ext>
+            </a:extLst>
+          </p:cNvPr>
+          <p:cNvSpPr>
+            <a:spLocks noGrp="1"/>
+          </p:cNvSpPr>
+          <p:nvPr>
+            <p:ph type="title"/>
+          </p:nvPr>
+        </p:nvSpPr>
+        <p:spPr/>
+        <p:txBody>
+          <a:bodyPr/>
+          <a:lstStyle/>
+          <a:p>
+            <a:r>
+              <a:rPr lang="en-US" dirty="0">
+                <a:latin typeface="Yu Gothic" panose="020B0400000000000000" pitchFamily="34" charset="-128"/>
+                <a:ea typeface="Yu Gothic" panose="020B0400000000000000" pitchFamily="34" charset="-128"/>
+              </a:rPr>
+              <a:t>Standing questions</a:t>
+            </a:r>
+          </a:p>
+        </p:txBody>
+      </p:sp>
+      <p:sp>
+        <p:nvSpPr>
+          <p:cNvPr id="3" name="Content Placeholder 2">
+            <a:extLst>
+              <a:ext uri="{FF2B5EF4-FFF2-40B4-BE49-F238E27FC236}">
+                <a16:creationId xmlns:a16="http://schemas.microsoft.com/office/drawing/2014/main" id="{B7017510-3A51-4778-BB7F-0F91AE0D6F96}"/>
+              </a:ext>
+            </a:extLst>
+          </p:cNvPr>
+          <p:cNvSpPr>
+            <a:spLocks noGrp="1"/>
+          </p:cNvSpPr>
+          <p:nvPr>
+            <p:ph idx="1"/>
+          </p:nvPr>
+        </p:nvSpPr>
+        <p:spPr/>
+        <p:txBody>
+          <a:bodyPr>
+            <a:normAutofit/>
+          </a:bodyPr>
+          <a:lstStyle/>
+          <a:p>
+            <a:r>
+              <a:rPr lang="en-US" dirty="0">
+                <a:latin typeface="Yu Gothic" panose="020B0400000000000000" pitchFamily="34" charset="-128"/>
+                <a:ea typeface="Yu Gothic" panose="020B0400000000000000" pitchFamily="34" charset="-128"/>
+              </a:rPr>
+              <a:t>Investigate edge length distribution</a:t>
+            </a:r>
+          </a:p>
+          <a:p>
+            <a:pPr lvl="1"/>
+            <a:r>
+              <a:rPr lang="en-US" dirty="0">
+                <a:latin typeface="Yu Gothic" panose="020B0400000000000000" pitchFamily="34" charset="-128"/>
+                <a:ea typeface="Yu Gothic" panose="020B0400000000000000" pitchFamily="34" charset="-128"/>
+              </a:rPr>
+              <a:t>Compare commensal bacteria to human demography</a:t>
+            </a:r>
+          </a:p>
+          <a:p>
+            <a:pPr lvl="1"/>
+            <a:r>
+              <a:rPr lang="en-US" dirty="0">
+                <a:latin typeface="Yu Gothic" panose="020B0400000000000000" pitchFamily="34" charset="-128"/>
+                <a:ea typeface="Yu Gothic" panose="020B0400000000000000" pitchFamily="34" charset="-128"/>
+              </a:rPr>
+              <a:t>Compare commensal bacteria to pathogens</a:t>
+            </a:r>
+          </a:p>
+        </p:txBody>
+      </p:sp>
+    </p:spTree>
+    <p:extLst>
+      <p:ext uri="{BB962C8B-B14F-4D97-AF65-F5344CB8AC3E}">
+        <p14:creationId xmlns:p14="http://schemas.microsoft.com/office/powerpoint/2010/main" val="2373352003"/>
+      </p:ext>
+    </p:extLst>
+  </p:cSld>
+  <p:clrMapOvr>
+    <a:masterClrMapping/>
+  </p:clrMapOvr>
+</p:sld>
+</file>
+
 <file path=ppt/slides/slide2.xml><?xml version="1.0" encoding="utf-8"?>
 <p:sld xmlns:a="http://schemas.openxmlformats.org/drawingml/2006/main" xmlns:r="http://schemas.openxmlformats.org/officeDocument/2006/relationships" xmlns:p="http://schemas.openxmlformats.org/presentationml/2006/main">
   <p:cSld>
@@ -4778,7 +5070,7 @@
           <p:cNvPr id="2" name="Title 1">
             <a:extLst>
               <a:ext uri="{FF2B5EF4-FFF2-40B4-BE49-F238E27FC236}">
-                <a16:creationId xmlns:a16="http://schemas.microsoft.com/office/drawing/2014/main" id="{1DA4FD9C-0575-4672-BDCF-805449EFAC7C}"/>
+                <a16:creationId xmlns:a16="http://schemas.microsoft.com/office/drawing/2014/main" id="{9C91C0AA-C083-4488-8B2B-78453C8EDC36}"/>
               </a:ext>
             </a:extLst>
           </p:cNvPr>
@@ -4796,127 +5088,50 @@
           <a:p>
             <a:r>
               <a:rPr lang="en-US" dirty="0"/>
-              <a:t>//TODO</a:t>
-            </a:r>
-          </a:p>
-        </p:txBody>
-      </p:sp>
-      <p:sp>
-        <p:nvSpPr>
-          <p:cNvPr id="3" name="Content Placeholder 2">
-            <a:extLst>
-              <a:ext uri="{FF2B5EF4-FFF2-40B4-BE49-F238E27FC236}">
-                <a16:creationId xmlns:a16="http://schemas.microsoft.com/office/drawing/2014/main" id="{B7017510-3A51-4778-BB7F-0F91AE0D6F96}"/>
-              </a:ext>
-            </a:extLst>
-          </p:cNvPr>
-          <p:cNvSpPr>
-            <a:spLocks noGrp="1"/>
-          </p:cNvSpPr>
-          <p:nvPr>
-            <p:ph idx="1"/>
-          </p:nvPr>
-        </p:nvSpPr>
-        <p:spPr/>
-        <p:txBody>
-          <a:bodyPr>
-            <a:normAutofit/>
-          </a:bodyPr>
-          <a:lstStyle/>
-          <a:p>
-            <a:r>
-              <a:rPr lang="en-US" dirty="0">
-                <a:sym typeface="Wingdings" panose="05000000000000000000" pitchFamily="2" charset="2"/>
-              </a:rPr>
-              <a:t>Convert output </a:t>
-            </a:r>
-            <a:r>
-              <a:rPr lang="en-US" dirty="0" err="1">
-                <a:sym typeface="Wingdings" panose="05000000000000000000" pitchFamily="2" charset="2"/>
-              </a:rPr>
-              <a:t>sfs</a:t>
-            </a:r>
-            <a:r>
-              <a:rPr lang="en-US" dirty="0">
-                <a:sym typeface="Wingdings" panose="05000000000000000000" pitchFamily="2" charset="2"/>
-              </a:rPr>
-              <a:t> formatting to </a:t>
-            </a:r>
-            <a:r>
-              <a:rPr lang="en-US" dirty="0" err="1">
-                <a:sym typeface="Wingdings" panose="05000000000000000000" pitchFamily="2" charset="2"/>
-              </a:rPr>
-              <a:t>Dadi</a:t>
-            </a:r>
-            <a:r>
-              <a:rPr lang="en-US" dirty="0">
-                <a:sym typeface="Wingdings" panose="05000000000000000000" pitchFamily="2" charset="2"/>
-              </a:rPr>
-              <a:t> format (or </a:t>
-            </a:r>
-            <a:r>
-              <a:rPr lang="en-US" dirty="0" err="1">
-                <a:sym typeface="Wingdings" panose="05000000000000000000" pitchFamily="2" charset="2"/>
-              </a:rPr>
-              <a:t>easySFS</a:t>
-            </a:r>
-            <a:r>
-              <a:rPr lang="en-US" dirty="0">
-                <a:sym typeface="Wingdings" panose="05000000000000000000" pitchFamily="2" charset="2"/>
-              </a:rPr>
-              <a:t>)</a:t>
-            </a:r>
-          </a:p>
-          <a:p>
-            <a:pPr lvl="1"/>
-            <a:r>
-              <a:rPr lang="en-US" dirty="0">
-                <a:sym typeface="Wingdings" panose="05000000000000000000" pitchFamily="2" charset="2"/>
-              </a:rPr>
-              <a:t>I will aim to have this by meeting tomorrow.</a:t>
-            </a:r>
-          </a:p>
-          <a:p>
-            <a:r>
-              <a:rPr lang="en-US" dirty="0">
-                <a:sym typeface="Wingdings" panose="05000000000000000000" pitchFamily="2" charset="2"/>
-              </a:rPr>
-              <a:t>Touch up plotting script</a:t>
-            </a:r>
-          </a:p>
-          <a:p>
-            <a:pPr lvl="1"/>
-            <a:r>
-              <a:rPr lang="en-US" dirty="0">
-                <a:sym typeface="Wingdings" panose="05000000000000000000" pitchFamily="2" charset="2"/>
-              </a:rPr>
-              <a:t>E.g., parse input and output so that it can quickly plot different a different species.</a:t>
-            </a:r>
-          </a:p>
-          <a:p>
-            <a:r>
-              <a:rPr lang="en-US" dirty="0">
-                <a:sym typeface="Wingdings" panose="05000000000000000000" pitchFamily="2" charset="2"/>
-              </a:rPr>
-              <a:t>Find reasonable initial guesses for demographic params</a:t>
-            </a:r>
-          </a:p>
-          <a:p>
-            <a:endParaRPr lang="en-US" dirty="0">
-              <a:sym typeface="Wingdings" panose="05000000000000000000" pitchFamily="2" charset="2"/>
-            </a:endParaRPr>
-          </a:p>
-          <a:p>
-            <a:endParaRPr lang="en-US" dirty="0">
-              <a:sym typeface="Wingdings" panose="05000000000000000000" pitchFamily="2" charset="2"/>
-            </a:endParaRPr>
-          </a:p>
-        </p:txBody>
-      </p:sp>
+              <a:t>SFS for B. </a:t>
+            </a:r>
+            <a:r>
+              <a:rPr lang="en-US" dirty="0" err="1"/>
+              <a:t>vulgatus</a:t>
+            </a:r>
+            <a:endParaRPr lang="en-US" dirty="0"/>
+          </a:p>
+        </p:txBody>
+      </p:sp>
+      <p:pic>
+        <p:nvPicPr>
+          <p:cNvPr id="5" name="Picture 4">
+            <a:extLst>
+              <a:ext uri="{FF2B5EF4-FFF2-40B4-BE49-F238E27FC236}">
+                <a16:creationId xmlns:a16="http://schemas.microsoft.com/office/drawing/2014/main" id="{15F39A58-A90A-484D-B6E8-75B593A627C8}"/>
+              </a:ext>
+            </a:extLst>
+          </p:cNvPr>
+          <p:cNvPicPr>
+            <a:picLocks noChangeAspect="1"/>
+          </p:cNvPicPr>
+          <p:nvPr/>
+        </p:nvPicPr>
+        <p:blipFill>
+          <a:blip r:embed="rId2"/>
+          <a:stretch>
+            <a:fillRect/>
+          </a:stretch>
+        </p:blipFill>
+        <p:spPr>
+          <a:xfrm>
+            <a:off x="0" y="1576210"/>
+            <a:ext cx="12192000" cy="4916665"/>
+          </a:xfrm>
+          <a:prstGeom prst="rect">
+            <a:avLst/>
+          </a:prstGeom>
+        </p:spPr>
+      </p:pic>
     </p:spTree>
     <p:extLst>
       <p:ext uri="{BB962C8B-B14F-4D97-AF65-F5344CB8AC3E}">
-        <p14:creationId xmlns:p14="http://schemas.microsoft.com/office/powerpoint/2010/main" val="1230404432"/>
+        <p14:creationId xmlns:p14="http://schemas.microsoft.com/office/powerpoint/2010/main" val="1388977413"/>
       </p:ext>
     </p:extLst>
   </p:cSld>
@@ -4948,7 +5163,7 @@
           <p:cNvPr id="2" name="Title 1">
             <a:extLst>
               <a:ext uri="{FF2B5EF4-FFF2-40B4-BE49-F238E27FC236}">
-                <a16:creationId xmlns:a16="http://schemas.microsoft.com/office/drawing/2014/main" id="{1DA4FD9C-0575-4672-BDCF-805449EFAC7C}"/>
+                <a16:creationId xmlns:a16="http://schemas.microsoft.com/office/drawing/2014/main" id="{9C91C0AA-C083-4488-8B2B-78453C8EDC36}"/>
               </a:ext>
             </a:extLst>
           </p:cNvPr>
@@ -4965,72 +5180,237 @@
           <a:lstStyle/>
           <a:p>
             <a:r>
-              <a:rPr lang="en-US" dirty="0">
-                <a:latin typeface="Yu Gothic" panose="020B0400000000000000" pitchFamily="34" charset="-128"/>
-                <a:ea typeface="Yu Gothic" panose="020B0400000000000000" pitchFamily="34" charset="-128"/>
-              </a:rPr>
-              <a:t>Standing questions</a:t>
-            </a:r>
-          </a:p>
-        </p:txBody>
-      </p:sp>
-      <p:sp>
-        <p:nvSpPr>
-          <p:cNvPr id="3" name="Content Placeholder 2">
-            <a:extLst>
-              <a:ext uri="{FF2B5EF4-FFF2-40B4-BE49-F238E27FC236}">
-                <a16:creationId xmlns:a16="http://schemas.microsoft.com/office/drawing/2014/main" id="{B7017510-3A51-4778-BB7F-0F91AE0D6F96}"/>
-              </a:ext>
-            </a:extLst>
-          </p:cNvPr>
-          <p:cNvSpPr>
-            <a:spLocks noGrp="1"/>
-          </p:cNvSpPr>
-          <p:nvPr>
-            <p:ph idx="1"/>
-          </p:nvPr>
-        </p:nvSpPr>
-        <p:spPr/>
-        <p:txBody>
-          <a:bodyPr>
-            <a:normAutofit/>
-          </a:bodyPr>
-          <a:lstStyle/>
-          <a:p>
-            <a:r>
-              <a:rPr lang="en-US" dirty="0">
-                <a:latin typeface="Yu Gothic" panose="020B0400000000000000" pitchFamily="34" charset="-128"/>
-                <a:ea typeface="Yu Gothic" panose="020B0400000000000000" pitchFamily="34" charset="-128"/>
-              </a:rPr>
-              <a:t>Investigate edge length distribution</a:t>
-            </a:r>
-          </a:p>
-          <a:p>
-            <a:pPr lvl="1"/>
-            <a:r>
-              <a:rPr lang="en-US" dirty="0">
-                <a:latin typeface="Yu Gothic" panose="020B0400000000000000" pitchFamily="34" charset="-128"/>
-                <a:ea typeface="Yu Gothic" panose="020B0400000000000000" pitchFamily="34" charset="-128"/>
-              </a:rPr>
-              <a:t>Compare commensal bacteria to human demography</a:t>
-            </a:r>
-          </a:p>
-          <a:p>
-            <a:pPr lvl="1"/>
-            <a:r>
-              <a:rPr lang="en-US" dirty="0">
-                <a:latin typeface="Yu Gothic" panose="020B0400000000000000" pitchFamily="34" charset="-128"/>
-                <a:ea typeface="Yu Gothic" panose="020B0400000000000000" pitchFamily="34" charset="-128"/>
-              </a:rPr>
-              <a:t>Compare commensal bacteria to pathogens</a:t>
-            </a:r>
-          </a:p>
-        </p:txBody>
-      </p:sp>
+              <a:rPr lang="en-US" dirty="0"/>
+              <a:t>SFS for B. </a:t>
+            </a:r>
+            <a:r>
+              <a:rPr lang="en-US" dirty="0" err="1"/>
+              <a:t>uniformis</a:t>
+            </a:r>
+            <a:endParaRPr lang="en-US" dirty="0"/>
+          </a:p>
+        </p:txBody>
+      </p:sp>
+      <p:pic>
+        <p:nvPicPr>
+          <p:cNvPr id="4" name="Picture 3">
+            <a:extLst>
+              <a:ext uri="{FF2B5EF4-FFF2-40B4-BE49-F238E27FC236}">
+                <a16:creationId xmlns:a16="http://schemas.microsoft.com/office/drawing/2014/main" id="{92423EDD-031B-4206-B17E-F0CFEE1D96CC}"/>
+              </a:ext>
+            </a:extLst>
+          </p:cNvPr>
+          <p:cNvPicPr>
+            <a:picLocks noChangeAspect="1"/>
+          </p:cNvPicPr>
+          <p:nvPr/>
+        </p:nvPicPr>
+        <p:blipFill>
+          <a:blip r:embed="rId2"/>
+          <a:stretch>
+            <a:fillRect/>
+          </a:stretch>
+        </p:blipFill>
+        <p:spPr>
+          <a:xfrm>
+            <a:off x="0" y="1521380"/>
+            <a:ext cx="12192000" cy="4971495"/>
+          </a:xfrm>
+          <a:prstGeom prst="rect">
+            <a:avLst/>
+          </a:prstGeom>
+        </p:spPr>
+      </p:pic>
     </p:spTree>
     <p:extLst>
       <p:ext uri="{BB962C8B-B14F-4D97-AF65-F5344CB8AC3E}">
-        <p14:creationId xmlns:p14="http://schemas.microsoft.com/office/powerpoint/2010/main" val="2373352003"/>
+        <p14:creationId xmlns:p14="http://schemas.microsoft.com/office/powerpoint/2010/main" val="1253621506"/>
+      </p:ext>
+    </p:extLst>
+  </p:cSld>
+  <p:clrMapOvr>
+    <a:masterClrMapping/>
+  </p:clrMapOvr>
+</p:sld>
+</file>
+
+<file path=ppt/slides/slide8.xml><?xml version="1.0" encoding="utf-8"?>
+<p:sld xmlns:a="http://schemas.openxmlformats.org/drawingml/2006/main" xmlns:r="http://schemas.openxmlformats.org/officeDocument/2006/relationships" xmlns:p="http://schemas.openxmlformats.org/presentationml/2006/main">
+  <p:cSld>
+    <p:spTree>
+      <p:nvGrpSpPr>
+        <p:cNvPr id="1" name=""/>
+        <p:cNvGrpSpPr/>
+        <p:nvPr/>
+      </p:nvGrpSpPr>
+      <p:grpSpPr>
+        <a:xfrm>
+          <a:off x="0" y="0"/>
+          <a:ext cx="0" cy="0"/>
+          <a:chOff x="0" y="0"/>
+          <a:chExt cx="0" cy="0"/>
+        </a:xfrm>
+      </p:grpSpPr>
+      <p:sp>
+        <p:nvSpPr>
+          <p:cNvPr id="2" name="Title 1">
+            <a:extLst>
+              <a:ext uri="{FF2B5EF4-FFF2-40B4-BE49-F238E27FC236}">
+                <a16:creationId xmlns:a16="http://schemas.microsoft.com/office/drawing/2014/main" id="{9C91C0AA-C083-4488-8B2B-78453C8EDC36}"/>
+              </a:ext>
+            </a:extLst>
+          </p:cNvPr>
+          <p:cNvSpPr>
+            <a:spLocks noGrp="1"/>
+          </p:cNvSpPr>
+          <p:nvPr>
+            <p:ph type="title"/>
+          </p:nvPr>
+        </p:nvSpPr>
+        <p:spPr/>
+        <p:txBody>
+          <a:bodyPr/>
+          <a:lstStyle/>
+          <a:p>
+            <a:r>
+              <a:rPr lang="en-US" dirty="0"/>
+              <a:t>SFS for A. </a:t>
+            </a:r>
+            <a:r>
+              <a:rPr lang="en-US" dirty="0" err="1"/>
+              <a:t>putredinis</a:t>
+            </a:r>
+            <a:endParaRPr lang="en-US" dirty="0"/>
+          </a:p>
+        </p:txBody>
+      </p:sp>
+      <p:pic>
+        <p:nvPicPr>
+          <p:cNvPr id="7" name="Picture 6">
+            <a:extLst>
+              <a:ext uri="{FF2B5EF4-FFF2-40B4-BE49-F238E27FC236}">
+                <a16:creationId xmlns:a16="http://schemas.microsoft.com/office/drawing/2014/main" id="{40162222-F6BC-4808-A3C2-2823F72BDE63}"/>
+              </a:ext>
+            </a:extLst>
+          </p:cNvPr>
+          <p:cNvPicPr>
+            <a:picLocks noChangeAspect="1"/>
+          </p:cNvPicPr>
+          <p:nvPr/>
+        </p:nvPicPr>
+        <p:blipFill>
+          <a:blip r:embed="rId2"/>
+          <a:stretch>
+            <a:fillRect/>
+          </a:stretch>
+        </p:blipFill>
+        <p:spPr>
+          <a:xfrm>
+            <a:off x="0" y="1628241"/>
+            <a:ext cx="12192000" cy="4899378"/>
+          </a:xfrm>
+          <a:prstGeom prst="rect">
+            <a:avLst/>
+          </a:prstGeom>
+        </p:spPr>
+      </p:pic>
+    </p:spTree>
+    <p:extLst>
+      <p:ext uri="{BB962C8B-B14F-4D97-AF65-F5344CB8AC3E}">
+        <p14:creationId xmlns:p14="http://schemas.microsoft.com/office/powerpoint/2010/main" val="2158360289"/>
+      </p:ext>
+    </p:extLst>
+  </p:cSld>
+  <p:clrMapOvr>
+    <a:masterClrMapping/>
+  </p:clrMapOvr>
+</p:sld>
+</file>
+
+<file path=ppt/slides/slide9.xml><?xml version="1.0" encoding="utf-8"?>
+<p:sld xmlns:a="http://schemas.openxmlformats.org/drawingml/2006/main" xmlns:r="http://schemas.openxmlformats.org/officeDocument/2006/relationships" xmlns:p="http://schemas.openxmlformats.org/presentationml/2006/main">
+  <p:cSld>
+    <p:spTree>
+      <p:nvGrpSpPr>
+        <p:cNvPr id="1" name=""/>
+        <p:cNvGrpSpPr/>
+        <p:nvPr/>
+      </p:nvGrpSpPr>
+      <p:grpSpPr>
+        <a:xfrm>
+          <a:off x="0" y="0"/>
+          <a:ext cx="0" cy="0"/>
+          <a:chOff x="0" y="0"/>
+          <a:chExt cx="0" cy="0"/>
+        </a:xfrm>
+      </p:grpSpPr>
+      <p:sp>
+        <p:nvSpPr>
+          <p:cNvPr id="2" name="Title 1">
+            <a:extLst>
+              <a:ext uri="{FF2B5EF4-FFF2-40B4-BE49-F238E27FC236}">
+                <a16:creationId xmlns:a16="http://schemas.microsoft.com/office/drawing/2014/main" id="{9C91C0AA-C083-4488-8B2B-78453C8EDC36}"/>
+              </a:ext>
+            </a:extLst>
+          </p:cNvPr>
+          <p:cNvSpPr>
+            <a:spLocks noGrp="1"/>
+          </p:cNvSpPr>
+          <p:nvPr>
+            <p:ph type="title"/>
+          </p:nvPr>
+        </p:nvSpPr>
+        <p:spPr/>
+        <p:txBody>
+          <a:bodyPr/>
+          <a:lstStyle/>
+          <a:p>
+            <a:r>
+              <a:rPr lang="en-US" dirty="0"/>
+              <a:t>SFS for E. </a:t>
+            </a:r>
+            <a:r>
+              <a:rPr lang="en-US" dirty="0" err="1"/>
+              <a:t>rectale</a:t>
+            </a:r>
+            <a:endParaRPr lang="en-US" dirty="0"/>
+          </a:p>
+        </p:txBody>
+      </p:sp>
+      <p:pic>
+        <p:nvPicPr>
+          <p:cNvPr id="4" name="Picture 3">
+            <a:extLst>
+              <a:ext uri="{FF2B5EF4-FFF2-40B4-BE49-F238E27FC236}">
+                <a16:creationId xmlns:a16="http://schemas.microsoft.com/office/drawing/2014/main" id="{4307A9BB-8EE2-4934-B8A3-32CE318E24AD}"/>
+              </a:ext>
+            </a:extLst>
+          </p:cNvPr>
+          <p:cNvPicPr>
+            <a:picLocks noChangeAspect="1"/>
+          </p:cNvPicPr>
+          <p:nvPr/>
+        </p:nvPicPr>
+        <p:blipFill>
+          <a:blip r:embed="rId2"/>
+          <a:stretch>
+            <a:fillRect/>
+          </a:stretch>
+        </p:blipFill>
+        <p:spPr>
+          <a:xfrm>
+            <a:off x="0" y="1969129"/>
+            <a:ext cx="12192000" cy="4888871"/>
+          </a:xfrm>
+          <a:prstGeom prst="rect">
+            <a:avLst/>
+          </a:prstGeom>
+        </p:spPr>
+      </p:pic>
+    </p:spTree>
+    <p:extLst>
+      <p:ext uri="{BB962C8B-B14F-4D97-AF65-F5344CB8AC3E}">
+        <p14:creationId xmlns:p14="http://schemas.microsoft.com/office/powerpoint/2010/main" val="4212762637"/>
       </p:ext>
     </p:extLst>
   </p:cSld>

</xml_diff>

<commit_message>
Updated rotation meeting slides, turn off debug mode.
</commit_message>
<xml_diff>
--- a/Summary/20210111_demo_for_ccgb_rotation_update.pptx
+++ b/Summary/20210111_demo_for_ccgb_rotation_update.pptx
@@ -4170,59 +4170,6 @@
               <a:rPr lang="en-US" dirty="0">
                 <a:sym typeface="Wingdings" panose="05000000000000000000" pitchFamily="2" charset="2"/>
               </a:rPr>
-              <a:t>Convert output </a:t>
-            </a:r>
-            <a:r>
-              <a:rPr lang="en-US" dirty="0" err="1">
-                <a:sym typeface="Wingdings" panose="05000000000000000000" pitchFamily="2" charset="2"/>
-              </a:rPr>
-              <a:t>sfs</a:t>
-            </a:r>
-            <a:r>
-              <a:rPr lang="en-US" dirty="0">
-                <a:sym typeface="Wingdings" panose="05000000000000000000" pitchFamily="2" charset="2"/>
-              </a:rPr>
-              <a:t> formatting to </a:t>
-            </a:r>
-            <a:r>
-              <a:rPr lang="en-US" dirty="0" err="1">
-                <a:sym typeface="Wingdings" panose="05000000000000000000" pitchFamily="2" charset="2"/>
-              </a:rPr>
-              <a:t>Dadi</a:t>
-            </a:r>
-            <a:r>
-              <a:rPr lang="en-US" dirty="0">
-                <a:sym typeface="Wingdings" panose="05000000000000000000" pitchFamily="2" charset="2"/>
-              </a:rPr>
-              <a:t> format (or </a:t>
-            </a:r>
-            <a:r>
-              <a:rPr lang="en-US" dirty="0" err="1">
-                <a:sym typeface="Wingdings" panose="05000000000000000000" pitchFamily="2" charset="2"/>
-              </a:rPr>
-              <a:t>easySFS</a:t>
-            </a:r>
-            <a:r>
-              <a:rPr lang="en-US" dirty="0">
-                <a:sym typeface="Wingdings" panose="05000000000000000000" pitchFamily="2" charset="2"/>
-              </a:rPr>
-              <a:t>)</a:t>
-            </a:r>
-          </a:p>
-          <a:p>
-            <a:pPr lvl="1"/>
-            <a:r>
-              <a:rPr lang="en-US" dirty="0">
-                <a:sym typeface="Wingdings" panose="05000000000000000000" pitchFamily="2" charset="2"/>
-              </a:rPr>
-              <a:t>I will aim to have this by meeting tomorrow.</a:t>
-            </a:r>
-          </a:p>
-          <a:p>
-            <a:r>
-              <a:rPr lang="en-US" dirty="0">
-                <a:sym typeface="Wingdings" panose="05000000000000000000" pitchFamily="2" charset="2"/>
-              </a:rPr>
               <a:t>Touch up plotting script</a:t>
             </a:r>
           </a:p>
@@ -4244,14 +4191,75 @@
             </a:r>
           </a:p>
           <a:p>
+            <a:r>
+              <a:rPr lang="en-US">
+                <a:sym typeface="Wingdings" panose="05000000000000000000" pitchFamily="2" charset="2"/>
+              </a:rPr>
+              <a:t>Read scripts without debug mode</a:t>
+            </a:r>
             <a:endParaRPr lang="en-US" dirty="0">
               <a:sym typeface="Wingdings" panose="05000000000000000000" pitchFamily="2" charset="2"/>
             </a:endParaRPr>
           </a:p>
           <a:p>
-            <a:endParaRPr lang="en-US" dirty="0">
-              <a:sym typeface="Wingdings" panose="05000000000000000000" pitchFamily="2" charset="2"/>
-            </a:endParaRPr>
+            <a:r>
+              <a:rPr lang="en-US" dirty="0">
+                <a:sym typeface="Wingdings" panose="05000000000000000000" pitchFamily="2" charset="2"/>
+              </a:rPr>
+              <a:t>Read about microbial demographics: H. pylori (</a:t>
+            </a:r>
+            <a:r>
+              <a:rPr lang="en-US" dirty="0" err="1">
+                <a:sym typeface="Wingdings" panose="05000000000000000000" pitchFamily="2" charset="2"/>
+              </a:rPr>
+              <a:t>Falush</a:t>
+            </a:r>
+            <a:r>
+              <a:rPr lang="en-US" dirty="0">
+                <a:sym typeface="Wingdings" panose="05000000000000000000" pitchFamily="2" charset="2"/>
+              </a:rPr>
+              <a:t>), P. </a:t>
+            </a:r>
+            <a:r>
+              <a:rPr lang="en-US" dirty="0" err="1">
+                <a:sym typeface="Wingdings" panose="05000000000000000000" pitchFamily="2" charset="2"/>
+              </a:rPr>
+              <a:t>copri</a:t>
+            </a:r>
+            <a:r>
+              <a:rPr lang="en-US" dirty="0">
+                <a:sym typeface="Wingdings" panose="05000000000000000000" pitchFamily="2" charset="2"/>
+              </a:rPr>
+              <a:t> (</a:t>
+            </a:r>
+            <a:r>
+              <a:rPr lang="en-US" dirty="0" err="1">
+                <a:sym typeface="Wingdings" panose="05000000000000000000" pitchFamily="2" charset="2"/>
+              </a:rPr>
+              <a:t>Tett</a:t>
+            </a:r>
+            <a:r>
+              <a:rPr lang="en-US" dirty="0">
+                <a:sym typeface="Wingdings" panose="05000000000000000000" pitchFamily="2" charset="2"/>
+              </a:rPr>
+              <a:t>), truong2017microbial</a:t>
+            </a:r>
+          </a:p>
+          <a:p>
+            <a:r>
+              <a:rPr lang="en-US" dirty="0">
+                <a:sym typeface="Wingdings" panose="05000000000000000000" pitchFamily="2" charset="2"/>
+              </a:rPr>
+              <a:t>Read Midas paper (nayfach2016integrated)</a:t>
+            </a:r>
+          </a:p>
+          <a:p>
+            <a:r>
+              <a:rPr lang="en-US" dirty="0">
+                <a:sym typeface="Wingdings" panose="05000000000000000000" pitchFamily="2" charset="2"/>
+              </a:rPr>
+              <a:t>Download microbiome data, run Midas</a:t>
+            </a:r>
           </a:p>
         </p:txBody>
       </p:sp>

</xml_diff>